<commit_message>
Aggiunte specifiche della testing machine
</commit_message>
<xml_diff>
--- a/Group_21 (Complete).pptx
+++ b/Group_21 (Complete).pptx
@@ -119,7 +119,7 @@
   </p:defaultTextStyle>
   <p:extLst>
     <p:ext uri="{EFAFB233-063F-42B5-8137-9DF3F51BA10A}">
-      <p15:sldGuideLst xmlns:p15="http://schemas.microsoft.com/office/powerpoint/2012/main" xmlns="">
+      <p15:sldGuideLst xmlns="" xmlns:p15="http://schemas.microsoft.com/office/powerpoint/2012/main">
         <p15:guide id="1" orient="horz" pos="2160">
           <p15:clr>
             <a:srgbClr val="A4A3A4"/>
@@ -218,6 +218,7 @@
           <a:p>
             <a:fld id="{DFAE6EC4-A7D1-406C-BADC-62A8D8C845E1}" type="datetimeFigureOut">
               <a:rPr lang="it-IT" smtClean="0"/>
+              <a:pPr/>
               <a:t>05/01/2016</a:t>
             </a:fld>
             <a:endParaRPr lang="it-IT"/>
@@ -379,6 +380,7 @@
           <a:p>
             <a:fld id="{C6E9CC65-D95D-4739-95E0-2DBB892F6E9D}" type="slidenum">
               <a:rPr lang="it-IT" smtClean="0"/>
+              <a:pPr/>
               <a:t>‹N›</a:t>
             </a:fld>
             <a:endParaRPr lang="it-IT"/>
@@ -550,6 +552,7 @@
           <a:p>
             <a:fld id="{C6E9CC65-D95D-4739-95E0-2DBB892F6E9D}" type="slidenum">
               <a:rPr lang="it-IT" smtClean="0"/>
+              <a:pPr/>
               <a:t>2</a:t>
             </a:fld>
             <a:endParaRPr lang="it-IT"/>
@@ -701,6 +704,7 @@
           <a:p>
             <a:fld id="{BC7F8B48-F341-44F6-8BF2-75E16B52E38F}" type="datetime1">
               <a:rPr lang="it-IT" smtClean="0"/>
+              <a:pPr/>
               <a:t>05/01/2016</a:t>
             </a:fld>
             <a:endParaRPr lang="it-IT"/>
@@ -1571,6 +1575,7 @@
           <a:p>
             <a:fld id="{59746DEE-1FFA-4BE7-BAFB-E2074C72F116}" type="datetime1">
               <a:rPr lang="it-IT" smtClean="0"/>
+              <a:pPr/>
               <a:t>05/01/2016</a:t>
             </a:fld>
             <a:endParaRPr lang="it-IT"/>
@@ -1747,6 +1752,7 @@
           <a:p>
             <a:fld id="{BFA666EF-5AC4-4F5B-B0C3-FD4DD2E15E61}" type="datetime1">
               <a:rPr lang="it-IT" smtClean="0"/>
+              <a:pPr/>
               <a:t>05/01/2016</a:t>
             </a:fld>
             <a:endParaRPr lang="it-IT"/>
@@ -1918,6 +1924,7 @@
           <a:p>
             <a:fld id="{C0F923A3-883F-40F8-9016-D06ACB330CD0}" type="datetime1">
               <a:rPr lang="it-IT" smtClean="0"/>
+              <a:pPr/>
               <a:t>05/01/2016</a:t>
             </a:fld>
             <a:endParaRPr lang="it-IT"/>
@@ -2129,6 +2136,7 @@
           <a:p>
             <a:fld id="{0AEFD5E1-7BE3-4166-AA7C-B9CBEC662055}" type="datetime1">
               <a:rPr lang="it-IT" smtClean="0"/>
+              <a:pPr/>
               <a:t>05/01/2016</a:t>
             </a:fld>
             <a:endParaRPr lang="it-IT"/>
@@ -2944,6 +2952,7 @@
           <a:p>
             <a:fld id="{53B92AC4-46C6-4671-BC37-D847AF845299}" type="datetime1">
               <a:rPr lang="it-IT" smtClean="0"/>
+              <a:pPr/>
               <a:t>05/01/2016</a:t>
             </a:fld>
             <a:endParaRPr lang="it-IT"/>
@@ -3181,6 +3190,7 @@
           <a:p>
             <a:fld id="{703FAA8A-7724-4A62-90A0-35945B1C2515}" type="datetime1">
               <a:rPr lang="it-IT" smtClean="0"/>
+              <a:pPr/>
               <a:t>05/01/2016</a:t>
             </a:fld>
             <a:endParaRPr lang="it-IT"/>
@@ -3505,6 +3515,7 @@
           <a:p>
             <a:fld id="{F3598392-B7D7-4B8D-AF3B-6377E0703252}" type="datetime1">
               <a:rPr lang="it-IT" smtClean="0"/>
+              <a:pPr/>
               <a:t>05/01/2016</a:t>
             </a:fld>
             <a:endParaRPr lang="it-IT"/>
@@ -3596,6 +3607,7 @@
           <a:p>
             <a:fld id="{4EB19F31-6CA3-4B46-8249-798036CAA816}" type="datetime1">
               <a:rPr lang="it-IT" smtClean="0"/>
+              <a:pPr/>
               <a:t>05/01/2016</a:t>
             </a:fld>
             <a:endParaRPr lang="it-IT"/>
@@ -4114,6 +4126,7 @@
           <a:p>
             <a:fld id="{8AA47653-CCF2-4431-9A28-6E2D2DB0E7F2}" type="datetime1">
               <a:rPr lang="it-IT" smtClean="0"/>
+              <a:pPr/>
               <a:t>05/01/2016</a:t>
             </a:fld>
             <a:endParaRPr lang="it-IT"/>
@@ -4626,6 +4639,7 @@
           <a:p>
             <a:fld id="{7EDE04AD-8934-49E1-9C22-DECC20F20FEA}" type="datetime1">
               <a:rPr lang="it-IT" smtClean="0"/>
+              <a:pPr/>
               <a:t>05/01/2016</a:t>
             </a:fld>
             <a:endParaRPr lang="it-IT"/>
@@ -4872,6 +4886,7 @@
           <a:p>
             <a:fld id="{27B0BCE2-5BCC-4A5E-8BCE-4FC6EC1685DC}" type="datetime1">
               <a:rPr lang="it-IT" smtClean="0"/>
+              <a:pPr/>
               <a:t>05/01/2016</a:t>
             </a:fld>
             <a:endParaRPr lang="it-IT"/>
@@ -5651,29 +5666,8 @@
                 <a:latin typeface="Cambria Math" pitchFamily="18" charset="0"/>
                 <a:ea typeface="Cambria Math" pitchFamily="18" charset="0"/>
               </a:rPr>
-              <a:t> </a:t>
-            </a:r>
-            <a:r>
-              <a:rPr lang="en-US" altLang="it-IT" sz="1600" dirty="0" smtClean="0">
-                <a:solidFill>
-                  <a:schemeClr val="accent2">
-                    <a:lumMod val="75000"/>
-                  </a:schemeClr>
-                </a:solidFill>
-                <a:latin typeface="Cambria Math" pitchFamily="18" charset="0"/>
-                <a:ea typeface="Cambria Math" pitchFamily="18" charset="0"/>
-              </a:rPr>
-              <a:t>Michele 220839</a:t>
-            </a:r>
-            <a:endParaRPr lang="en-US" altLang="it-IT" sz="1600" dirty="0" smtClean="0">
-              <a:solidFill>
-                <a:schemeClr val="accent2">
-                  <a:lumMod val="75000"/>
-                </a:schemeClr>
-              </a:solidFill>
-              <a:latin typeface="Cambria Math" pitchFamily="18" charset="0"/>
-              <a:ea typeface="Cambria Math" pitchFamily="18" charset="0"/>
-            </a:endParaRPr>
+              <a:t> Michele 220839</a:t>
+            </a:r>
           </a:p>
           <a:p>
             <a:pPr algn="ctr">
@@ -5704,8 +5698,11 @@
                 <a:latin typeface="Cambria Math" pitchFamily="18" charset="0"/>
                 <a:ea typeface="Cambria Math" pitchFamily="18" charset="0"/>
               </a:rPr>
-              <a:t>Leone </a:t>
-            </a:r>
+              <a:t>Leone Rosario 229512</a:t>
+            </a:r>
+          </a:p>
+          <a:p>
+            <a:pPr algn="ctr"/>
             <a:r>
               <a:rPr lang="it-IT" sz="1600" dirty="0" smtClean="0">
                 <a:solidFill>
@@ -5716,7 +5713,19 @@
                 <a:latin typeface="Cambria Math" pitchFamily="18" charset="0"/>
                 <a:ea typeface="Cambria Math" pitchFamily="18" charset="0"/>
               </a:rPr>
-              <a:t>Rosario </a:t>
+              <a:t>Malinconico </a:t>
+            </a:r>
+            <a:r>
+              <a:rPr lang="it-IT" sz="1600" dirty="0" err="1" smtClean="0">
+                <a:solidFill>
+                  <a:schemeClr val="accent2">
+                    <a:lumMod val="75000"/>
+                  </a:schemeClr>
+                </a:solidFill>
+                <a:latin typeface="Cambria Math" pitchFamily="18" charset="0"/>
+                <a:ea typeface="Cambria Math" pitchFamily="18" charset="0"/>
+              </a:rPr>
+              <a:t>Aniello</a:t>
             </a:r>
             <a:r>
               <a:rPr lang="it-IT" sz="1600" dirty="0" smtClean="0">
@@ -5728,20 +5737,40 @@
                 <a:latin typeface="Cambria Math" pitchFamily="18" charset="0"/>
                 <a:ea typeface="Cambria Math" pitchFamily="18" charset="0"/>
               </a:rPr>
-              <a:t>229512</a:t>
-            </a:r>
-            <a:endParaRPr lang="it-IT" sz="1600" dirty="0" smtClean="0">
-              <a:solidFill>
-                <a:schemeClr val="accent2">
-                  <a:lumMod val="75000"/>
-                </a:schemeClr>
-              </a:solidFill>
-              <a:latin typeface="Cambria Math" pitchFamily="18" charset="0"/>
-              <a:ea typeface="Cambria Math" pitchFamily="18" charset="0"/>
-            </a:endParaRPr>
+              <a:t> Paolo 229171</a:t>
+            </a:r>
+          </a:p>
+          <a:p>
+            <a:pPr algn="ctr">
+              <a:buNone/>
+            </a:pPr>
+            <a:r>
+              <a:rPr lang="it-IT" altLang="it-IT" sz="1600" dirty="0" smtClean="0">
+                <a:solidFill>
+                  <a:schemeClr val="accent2">
+                    <a:lumMod val="75000"/>
+                  </a:schemeClr>
+                </a:solidFill>
+                <a:latin typeface="Cambria Math" pitchFamily="18" charset="0"/>
+                <a:ea typeface="Cambria Math" pitchFamily="18" charset="0"/>
+              </a:rPr>
+              <a:t>Pellone Daniele 231853</a:t>
+            </a:r>
           </a:p>
           <a:p>
             <a:pPr algn="ctr"/>
+            <a:r>
+              <a:rPr lang="it-IT" sz="1600" dirty="0">
+                <a:solidFill>
+                  <a:schemeClr val="accent2">
+                    <a:lumMod val="75000"/>
+                  </a:schemeClr>
+                </a:solidFill>
+                <a:latin typeface="Cambria Math" pitchFamily="18" charset="0"/>
+                <a:ea typeface="Cambria Math" pitchFamily="18" charset="0"/>
+              </a:rPr>
+              <a:t>Popov </a:t>
+            </a:r>
             <a:r>
               <a:rPr lang="it-IT" sz="1600" dirty="0" smtClean="0">
                 <a:solidFill>
@@ -5752,120 +5781,7 @@
                 <a:latin typeface="Cambria Math" pitchFamily="18" charset="0"/>
                 <a:ea typeface="Cambria Math" pitchFamily="18" charset="0"/>
               </a:rPr>
-              <a:t>Malinconico </a:t>
-            </a:r>
-            <a:r>
-              <a:rPr lang="it-IT" sz="1600" dirty="0" err="1" smtClean="0">
-                <a:solidFill>
-                  <a:schemeClr val="accent2">
-                    <a:lumMod val="75000"/>
-                  </a:schemeClr>
-                </a:solidFill>
-                <a:latin typeface="Cambria Math" pitchFamily="18" charset="0"/>
-                <a:ea typeface="Cambria Math" pitchFamily="18" charset="0"/>
-              </a:rPr>
-              <a:t>Aniello</a:t>
-            </a:r>
-            <a:r>
-              <a:rPr lang="it-IT" sz="1600" dirty="0" smtClean="0">
-                <a:solidFill>
-                  <a:schemeClr val="accent2">
-                    <a:lumMod val="75000"/>
-                  </a:schemeClr>
-                </a:solidFill>
-                <a:latin typeface="Cambria Math" pitchFamily="18" charset="0"/>
-                <a:ea typeface="Cambria Math" pitchFamily="18" charset="0"/>
-              </a:rPr>
-              <a:t> </a:t>
-            </a:r>
-            <a:r>
-              <a:rPr lang="it-IT" sz="1600" dirty="0" smtClean="0">
-                <a:solidFill>
-                  <a:schemeClr val="accent2">
-                    <a:lumMod val="75000"/>
-                  </a:schemeClr>
-                </a:solidFill>
-                <a:latin typeface="Cambria Math" pitchFamily="18" charset="0"/>
-                <a:ea typeface="Cambria Math" pitchFamily="18" charset="0"/>
-              </a:rPr>
-              <a:t>Paolo </a:t>
-            </a:r>
-            <a:r>
-              <a:rPr lang="it-IT" sz="1600" dirty="0" smtClean="0">
-                <a:solidFill>
-                  <a:schemeClr val="accent2">
-                    <a:lumMod val="75000"/>
-                  </a:schemeClr>
-                </a:solidFill>
-                <a:latin typeface="Cambria Math" pitchFamily="18" charset="0"/>
-                <a:ea typeface="Cambria Math" pitchFamily="18" charset="0"/>
-              </a:rPr>
-              <a:t>229171</a:t>
-            </a:r>
-            <a:endParaRPr lang="it-IT" sz="1600" dirty="0" smtClean="0">
-              <a:solidFill>
-                <a:schemeClr val="accent2">
-                  <a:lumMod val="75000"/>
-                </a:schemeClr>
-              </a:solidFill>
-              <a:latin typeface="Cambria Math" pitchFamily="18" charset="0"/>
-              <a:ea typeface="Cambria Math" pitchFamily="18" charset="0"/>
-            </a:endParaRPr>
-          </a:p>
-          <a:p>
-            <a:pPr algn="ctr">
-              <a:buNone/>
-            </a:pPr>
-            <a:r>
-              <a:rPr lang="it-IT" altLang="it-IT" sz="1600" dirty="0" smtClean="0">
-                <a:solidFill>
-                  <a:schemeClr val="accent2">
-                    <a:lumMod val="75000"/>
-                  </a:schemeClr>
-                </a:solidFill>
-                <a:latin typeface="Cambria Math" pitchFamily="18" charset="0"/>
-                <a:ea typeface="Cambria Math" pitchFamily="18" charset="0"/>
-              </a:rPr>
-              <a:t>Pellone Daniele 231853</a:t>
-            </a:r>
-          </a:p>
-          <a:p>
-            <a:pPr algn="ctr"/>
-            <a:r>
-              <a:rPr lang="it-IT" sz="1600" dirty="0">
-                <a:solidFill>
-                  <a:schemeClr val="accent2">
-                    <a:lumMod val="75000"/>
-                  </a:schemeClr>
-                </a:solidFill>
-                <a:latin typeface="Cambria Math" pitchFamily="18" charset="0"/>
-                <a:ea typeface="Cambria Math" pitchFamily="18" charset="0"/>
-              </a:rPr>
-              <a:t>Popov </a:t>
-            </a:r>
-            <a:r>
-              <a:rPr lang="it-IT" sz="1600" dirty="0" smtClean="0">
-                <a:solidFill>
-                  <a:schemeClr val="accent2">
-                    <a:lumMod val="75000"/>
-                  </a:schemeClr>
-                </a:solidFill>
-                <a:latin typeface="Cambria Math" pitchFamily="18" charset="0"/>
-                <a:ea typeface="Cambria Math" pitchFamily="18" charset="0"/>
-              </a:rPr>
-              <a:t>Valentin </a:t>
-            </a:r>
-            <a:r>
-              <a:rPr lang="it-IT" sz="1600" dirty="0" smtClean="0">
-                <a:solidFill>
-                  <a:schemeClr val="accent2">
-                    <a:lumMod val="75000"/>
-                  </a:schemeClr>
-                </a:solidFill>
-                <a:latin typeface="Cambria Math" pitchFamily="18" charset="0"/>
-                <a:ea typeface="Cambria Math" pitchFamily="18" charset="0"/>
-              </a:rPr>
-              <a:t>229706</a:t>
+              <a:t>Valentin 229706</a:t>
             </a:r>
             <a:endParaRPr lang="en-US" altLang="it-IT" sz="1600" dirty="0" smtClean="0">
               <a:solidFill>
@@ -6104,18 +6020,6 @@
               </a:rPr>
               <a:t>Thanks for your attention</a:t>
             </a:r>
-            <a:r>
-              <a:rPr lang="en-US" altLang="it-IT" sz="4000" b="1" dirty="0" smtClean="0">
-                <a:solidFill>
-                  <a:schemeClr val="accent2">
-                    <a:lumMod val="75000"/>
-                  </a:schemeClr>
-                </a:solidFill>
-                <a:latin typeface="Cambria Math" pitchFamily="18" charset="0"/>
-                <a:ea typeface="Cambria Math" pitchFamily="18" charset="0"/>
-              </a:rPr>
-              <a:t/>
-            </a:r>
             <a:br>
               <a:rPr lang="en-US" altLang="it-IT" sz="4000" b="1" dirty="0" smtClean="0">
                 <a:solidFill>
@@ -6226,7 +6130,7 @@
               </a:lnSpc>
               <a:buNone/>
             </a:pPr>
-            <a:endParaRPr lang="it-IT" smtClean="0"/>
+            <a:endParaRPr lang="it-IT" dirty="0" smtClean="0"/>
           </a:p>
           <a:p>
             <a:pPr>
@@ -6235,12 +6139,23 @@
               </a:lnSpc>
             </a:pPr>
             <a:r>
-              <a:rPr lang="it-IT" smtClean="0">
-                <a:latin typeface="Cambria Math" pitchFamily="18" charset="0"/>
-                <a:ea typeface="Cambria Math" pitchFamily="18" charset="0"/>
-              </a:rPr>
-              <a:t>2048 Iterations</a:t>
-            </a:r>
+              <a:rPr lang="it-IT" dirty="0" smtClean="0">
+                <a:latin typeface="Cambria Math" pitchFamily="18" charset="0"/>
+                <a:ea typeface="Cambria Math" pitchFamily="18" charset="0"/>
+              </a:rPr>
+              <a:t>2048 </a:t>
+            </a:r>
+            <a:r>
+              <a:rPr lang="it-IT" dirty="0" err="1" smtClean="0">
+                <a:latin typeface="Cambria Math" pitchFamily="18" charset="0"/>
+                <a:ea typeface="Cambria Math" pitchFamily="18" charset="0"/>
+              </a:rPr>
+              <a:t>Iterations</a:t>
+            </a:r>
+            <a:endParaRPr lang="it-IT" dirty="0" smtClean="0">
+              <a:latin typeface="Cambria Math" pitchFamily="18" charset="0"/>
+              <a:ea typeface="Cambria Math" pitchFamily="18" charset="0"/>
+            </a:endParaRPr>
           </a:p>
           <a:p>
             <a:pPr>
@@ -6249,12 +6164,72 @@
               </a:lnSpc>
             </a:pPr>
             <a:r>
-              <a:rPr lang="it-IT" smtClean="0">
-                <a:latin typeface="Cambria Math" pitchFamily="18" charset="0"/>
-                <a:ea typeface="Cambria Math" pitchFamily="18" charset="0"/>
-              </a:rPr>
-              <a:t>Regret Insertion for the initial construction</a:t>
-            </a:r>
+              <a:rPr lang="it-IT" dirty="0" err="1" smtClean="0">
+                <a:latin typeface="Cambria Math" pitchFamily="18" charset="0"/>
+                <a:ea typeface="Cambria Math" pitchFamily="18" charset="0"/>
+              </a:rPr>
+              <a:t>Regret</a:t>
+            </a:r>
+            <a:r>
+              <a:rPr lang="it-IT" dirty="0" smtClean="0">
+                <a:latin typeface="Cambria Math" pitchFamily="18" charset="0"/>
+                <a:ea typeface="Cambria Math" pitchFamily="18" charset="0"/>
+              </a:rPr>
+              <a:t> </a:t>
+            </a:r>
+            <a:r>
+              <a:rPr lang="it-IT" dirty="0" err="1" smtClean="0">
+                <a:latin typeface="Cambria Math" pitchFamily="18" charset="0"/>
+                <a:ea typeface="Cambria Math" pitchFamily="18" charset="0"/>
+              </a:rPr>
+              <a:t>Insertion</a:t>
+            </a:r>
+            <a:r>
+              <a:rPr lang="it-IT" dirty="0" smtClean="0">
+                <a:latin typeface="Cambria Math" pitchFamily="18" charset="0"/>
+                <a:ea typeface="Cambria Math" pitchFamily="18" charset="0"/>
+              </a:rPr>
+              <a:t> </a:t>
+            </a:r>
+            <a:r>
+              <a:rPr lang="it-IT" dirty="0" err="1" smtClean="0">
+                <a:latin typeface="Cambria Math" pitchFamily="18" charset="0"/>
+                <a:ea typeface="Cambria Math" pitchFamily="18" charset="0"/>
+              </a:rPr>
+              <a:t>for</a:t>
+            </a:r>
+            <a:r>
+              <a:rPr lang="it-IT" dirty="0" smtClean="0">
+                <a:latin typeface="Cambria Math" pitchFamily="18" charset="0"/>
+                <a:ea typeface="Cambria Math" pitchFamily="18" charset="0"/>
+              </a:rPr>
+              <a:t> the </a:t>
+            </a:r>
+            <a:r>
+              <a:rPr lang="it-IT" dirty="0" err="1" smtClean="0">
+                <a:latin typeface="Cambria Math" pitchFamily="18" charset="0"/>
+                <a:ea typeface="Cambria Math" pitchFamily="18" charset="0"/>
+              </a:rPr>
+              <a:t>initial</a:t>
+            </a:r>
+            <a:r>
+              <a:rPr lang="it-IT" dirty="0" smtClean="0">
+                <a:latin typeface="Cambria Math" pitchFamily="18" charset="0"/>
+                <a:ea typeface="Cambria Math" pitchFamily="18" charset="0"/>
+              </a:rPr>
+              <a:t> </a:t>
+            </a:r>
+            <a:r>
+              <a:rPr lang="it-IT" dirty="0" err="1" smtClean="0">
+                <a:latin typeface="Cambria Math" pitchFamily="18" charset="0"/>
+                <a:ea typeface="Cambria Math" pitchFamily="18" charset="0"/>
+              </a:rPr>
+              <a:t>construction</a:t>
+            </a:r>
+            <a:endParaRPr lang="it-IT" dirty="0" smtClean="0">
+              <a:latin typeface="Cambria Math" pitchFamily="18" charset="0"/>
+              <a:ea typeface="Cambria Math" pitchFamily="18" charset="0"/>
+            </a:endParaRPr>
           </a:p>
           <a:p>
             <a:pPr>
@@ -6263,12 +6238,37 @@
               </a:lnSpc>
             </a:pPr>
             <a:r>
-              <a:rPr lang="it-IT" smtClean="0">
-                <a:latin typeface="Cambria Math" pitchFamily="18" charset="0"/>
-                <a:ea typeface="Cambria Math" pitchFamily="18" charset="0"/>
-              </a:rPr>
-              <a:t>2 Search strategies</a:t>
-            </a:r>
+              <a:rPr lang="it-IT" dirty="0" smtClean="0">
+                <a:latin typeface="Cambria Math" pitchFamily="18" charset="0"/>
+                <a:ea typeface="Cambria Math" pitchFamily="18" charset="0"/>
+              </a:rPr>
+              <a:t>2 </a:t>
+            </a:r>
+            <a:r>
+              <a:rPr lang="it-IT" dirty="0" err="1" smtClean="0">
+                <a:latin typeface="Cambria Math" pitchFamily="18" charset="0"/>
+                <a:ea typeface="Cambria Math" pitchFamily="18" charset="0"/>
+              </a:rPr>
+              <a:t>Search</a:t>
+            </a:r>
+            <a:r>
+              <a:rPr lang="it-IT" dirty="0" smtClean="0">
+                <a:latin typeface="Cambria Math" pitchFamily="18" charset="0"/>
+                <a:ea typeface="Cambria Math" pitchFamily="18" charset="0"/>
+              </a:rPr>
+              <a:t> </a:t>
+            </a:r>
+            <a:r>
+              <a:rPr lang="it-IT" dirty="0" err="1" smtClean="0">
+                <a:latin typeface="Cambria Math" pitchFamily="18" charset="0"/>
+                <a:ea typeface="Cambria Math" pitchFamily="18" charset="0"/>
+              </a:rPr>
+              <a:t>strategies</a:t>
+            </a:r>
+            <a:endParaRPr lang="it-IT" dirty="0" smtClean="0">
+              <a:latin typeface="Cambria Math" pitchFamily="18" charset="0"/>
+              <a:ea typeface="Cambria Math" pitchFamily="18" charset="0"/>
+            </a:endParaRPr>
           </a:p>
           <a:p>
             <a:pPr>
@@ -6277,15 +6277,178 @@
               </a:lnSpc>
             </a:pPr>
             <a:r>
-              <a:rPr lang="it-IT" smtClean="0">
-                <a:latin typeface="Cambria Math" pitchFamily="18" charset="0"/>
-                <a:ea typeface="Cambria Math" pitchFamily="18" charset="0"/>
-              </a:rPr>
-              <a:t>Iterative Tuning and Error Refinement</a:t>
-            </a:r>
-          </a:p>
-          <a:p>
-            <a:endParaRPr lang="it-IT" smtClean="0"/>
+              <a:rPr lang="it-IT" dirty="0" smtClean="0">
+                <a:latin typeface="Cambria Math" pitchFamily="18" charset="0"/>
+                <a:ea typeface="Cambria Math" pitchFamily="18" charset="0"/>
+              </a:rPr>
+              <a:t>Iterative </a:t>
+            </a:r>
+            <a:r>
+              <a:rPr lang="it-IT" dirty="0" err="1" smtClean="0">
+                <a:latin typeface="Cambria Math" pitchFamily="18" charset="0"/>
+                <a:ea typeface="Cambria Math" pitchFamily="18" charset="0"/>
+              </a:rPr>
+              <a:t>Tuning</a:t>
+            </a:r>
+            <a:r>
+              <a:rPr lang="it-IT" dirty="0" smtClean="0">
+                <a:latin typeface="Cambria Math" pitchFamily="18" charset="0"/>
+                <a:ea typeface="Cambria Math" pitchFamily="18" charset="0"/>
+              </a:rPr>
+              <a:t> and </a:t>
+            </a:r>
+            <a:r>
+              <a:rPr lang="it-IT" dirty="0" err="1" smtClean="0">
+                <a:latin typeface="Cambria Math" pitchFamily="18" charset="0"/>
+                <a:ea typeface="Cambria Math" pitchFamily="18" charset="0"/>
+              </a:rPr>
+              <a:t>Error</a:t>
+            </a:r>
+            <a:r>
+              <a:rPr lang="it-IT" dirty="0" smtClean="0">
+                <a:latin typeface="Cambria Math" pitchFamily="18" charset="0"/>
+                <a:ea typeface="Cambria Math" pitchFamily="18" charset="0"/>
+              </a:rPr>
+              <a:t> </a:t>
+            </a:r>
+            <a:r>
+              <a:rPr lang="it-IT" dirty="0" err="1" smtClean="0">
+                <a:latin typeface="Cambria Math" pitchFamily="18" charset="0"/>
+                <a:ea typeface="Cambria Math" pitchFamily="18" charset="0"/>
+              </a:rPr>
+              <a:t>Refinement</a:t>
+            </a:r>
+            <a:endParaRPr lang="it-IT" dirty="0" smtClean="0">
+              <a:latin typeface="Cambria Math" pitchFamily="18" charset="0"/>
+              <a:ea typeface="Cambria Math" pitchFamily="18" charset="0"/>
+            </a:endParaRPr>
+          </a:p>
+          <a:p>
+            <a:r>
+              <a:rPr lang="it-IT" dirty="0" err="1" smtClean="0">
+                <a:latin typeface="Cambria Math" pitchFamily="18" charset="0"/>
+                <a:ea typeface="Cambria Math" pitchFamily="18" charset="0"/>
+              </a:rPr>
+              <a:t>Testing</a:t>
+            </a:r>
+            <a:r>
+              <a:rPr lang="it-IT" dirty="0" smtClean="0">
+                <a:latin typeface="Cambria Math" pitchFamily="18" charset="0"/>
+                <a:ea typeface="Cambria Math" pitchFamily="18" charset="0"/>
+              </a:rPr>
+              <a:t> </a:t>
+            </a:r>
+            <a:r>
+              <a:rPr lang="it-IT" dirty="0" err="1" smtClean="0">
+                <a:latin typeface="Cambria Math" pitchFamily="18" charset="0"/>
+                <a:ea typeface="Cambria Math" pitchFamily="18" charset="0"/>
+              </a:rPr>
+              <a:t>machine</a:t>
+            </a:r>
+            <a:r>
+              <a:rPr lang="it-IT" dirty="0" smtClean="0">
+                <a:latin typeface="Cambria Math" pitchFamily="18" charset="0"/>
+                <a:ea typeface="Cambria Math" pitchFamily="18" charset="0"/>
+              </a:rPr>
+              <a:t> </a:t>
+            </a:r>
+            <a:r>
+              <a:rPr lang="it-IT" dirty="0" err="1" smtClean="0">
+                <a:latin typeface="Cambria Math" pitchFamily="18" charset="0"/>
+                <a:ea typeface="Cambria Math" pitchFamily="18" charset="0"/>
+              </a:rPr>
+              <a:t>specifics</a:t>
+            </a:r>
+            <a:r>
+              <a:rPr lang="it-IT" dirty="0" smtClean="0">
+                <a:latin typeface="Cambria Math" pitchFamily="18" charset="0"/>
+                <a:ea typeface="Cambria Math" pitchFamily="18" charset="0"/>
+              </a:rPr>
+              <a:t>:</a:t>
+            </a:r>
+          </a:p>
+          <a:p>
+            <a:pPr lvl="1"/>
+            <a:r>
+              <a:rPr lang="it-IT" dirty="0" smtClean="0">
+                <a:latin typeface="Cambria Math" pitchFamily="18" charset="0"/>
+                <a:ea typeface="Cambria Math" pitchFamily="18" charset="0"/>
+              </a:rPr>
+              <a:t>CPU: Intel </a:t>
+            </a:r>
+            <a:r>
+              <a:rPr lang="it-IT" dirty="0" err="1" smtClean="0">
+                <a:latin typeface="Cambria Math" pitchFamily="18" charset="0"/>
+                <a:ea typeface="Cambria Math" pitchFamily="18" charset="0"/>
+              </a:rPr>
+              <a:t>Core</a:t>
+            </a:r>
+            <a:r>
+              <a:rPr lang="it-IT" dirty="0" smtClean="0">
+                <a:latin typeface="Cambria Math" pitchFamily="18" charset="0"/>
+                <a:ea typeface="Cambria Math" pitchFamily="18" charset="0"/>
+              </a:rPr>
+              <a:t> i7-4500U (1,8 </a:t>
+            </a:r>
+            <a:r>
+              <a:rPr lang="it-IT" dirty="0" err="1" smtClean="0">
+                <a:latin typeface="Cambria Math" pitchFamily="18" charset="0"/>
+                <a:ea typeface="Cambria Math" pitchFamily="18" charset="0"/>
+              </a:rPr>
+              <a:t>GHz</a:t>
+            </a:r>
+            <a:r>
+              <a:rPr lang="it-IT" dirty="0" smtClean="0">
+                <a:latin typeface="Cambria Math" pitchFamily="18" charset="0"/>
+                <a:ea typeface="Cambria Math" pitchFamily="18" charset="0"/>
+              </a:rPr>
+              <a:t>)</a:t>
+            </a:r>
+          </a:p>
+          <a:p>
+            <a:pPr lvl="1"/>
+            <a:r>
+              <a:rPr lang="it-IT" dirty="0" smtClean="0">
+                <a:latin typeface="Cambria Math" pitchFamily="18" charset="0"/>
+                <a:ea typeface="Cambria Math" pitchFamily="18" charset="0"/>
+              </a:rPr>
+              <a:t>2 </a:t>
+            </a:r>
+            <a:r>
+              <a:rPr lang="it-IT" dirty="0" err="1" smtClean="0">
+                <a:latin typeface="Cambria Math" pitchFamily="18" charset="0"/>
+                <a:ea typeface="Cambria Math" pitchFamily="18" charset="0"/>
+              </a:rPr>
+              <a:t>Cores</a:t>
+            </a:r>
+            <a:endParaRPr lang="it-IT" dirty="0" smtClean="0">
+              <a:latin typeface="Cambria Math" pitchFamily="18" charset="0"/>
+              <a:ea typeface="Cambria Math" pitchFamily="18" charset="0"/>
+            </a:endParaRPr>
+          </a:p>
+          <a:p>
+            <a:pPr lvl="1"/>
+            <a:r>
+              <a:rPr lang="it-IT" dirty="0" smtClean="0">
+                <a:latin typeface="Cambria Math" pitchFamily="18" charset="0"/>
+                <a:ea typeface="Cambria Math" pitchFamily="18" charset="0"/>
+              </a:rPr>
+              <a:t>RAM: 12 GB </a:t>
+            </a:r>
+          </a:p>
+          <a:p>
+            <a:pPr>
+              <a:lnSpc>
+                <a:spcPct val="150000"/>
+              </a:lnSpc>
+            </a:pPr>
+            <a:endParaRPr lang="it-IT" dirty="0" smtClean="0">
+              <a:latin typeface="Cambria Math" pitchFamily="18" charset="0"/>
+              <a:ea typeface="Cambria Math" pitchFamily="18" charset="0"/>
+            </a:endParaRPr>
+          </a:p>
+          <a:p>
+            <a:endParaRPr lang="it-IT" dirty="0" smtClean="0"/>
           </a:p>
           <a:p>
             <a:pPr marL="457200" indent="-457200"/>
@@ -6365,24 +6528,38 @@
           <a:lstStyle/>
           <a:p>
             <a:r>
-              <a:rPr lang="it-IT" smtClean="0">
+              <a:rPr lang="it-IT" dirty="0" smtClean="0">
                 <a:latin typeface="Cambria Math" pitchFamily="18" charset="0"/>
                 <a:ea typeface="Cambria Math" pitchFamily="18" charset="0"/>
               </a:rPr>
               <a:t>VRPTW SOLVER</a:t>
             </a:r>
             <a:br>
-              <a:rPr lang="it-IT" smtClean="0">
+              <a:rPr lang="it-IT" dirty="0" smtClean="0">
                 <a:latin typeface="Cambria Math" pitchFamily="18" charset="0"/>
                 <a:ea typeface="Cambria Math" pitchFamily="18" charset="0"/>
               </a:rPr>
             </a:br>
             <a:r>
-              <a:rPr lang="it-IT" smtClean="0">
-                <a:latin typeface="Cambria Math" pitchFamily="18" charset="0"/>
-                <a:ea typeface="Cambria Math" pitchFamily="18" charset="0"/>
-              </a:rPr>
-              <a:t>Search Strategies</a:t>
+              <a:rPr lang="it-IT" dirty="0" err="1" smtClean="0">
+                <a:latin typeface="Cambria Math" pitchFamily="18" charset="0"/>
+                <a:ea typeface="Cambria Math" pitchFamily="18" charset="0"/>
+              </a:rPr>
+              <a:t>Search</a:t>
+            </a:r>
+            <a:r>
+              <a:rPr lang="it-IT" dirty="0" smtClean="0">
+                <a:latin typeface="Cambria Math" pitchFamily="18" charset="0"/>
+                <a:ea typeface="Cambria Math" pitchFamily="18" charset="0"/>
+              </a:rPr>
+              <a:t> </a:t>
+            </a:r>
+            <a:r>
+              <a:rPr lang="it-IT" dirty="0" err="1" smtClean="0">
+                <a:latin typeface="Cambria Math" pitchFamily="18" charset="0"/>
+                <a:ea typeface="Cambria Math" pitchFamily="18" charset="0"/>
+              </a:rPr>
+              <a:t>Strategies</a:t>
             </a:r>
             <a:endParaRPr lang="it-IT" dirty="0">
               <a:latin typeface="Cambria Math" pitchFamily="18" charset="0"/>
@@ -6658,56 +6835,179 @@
         <p:spPr/>
         <p:txBody>
           <a:bodyPr>
-            <a:normAutofit lnSpcReduction="10000"/>
+            <a:normAutofit fontScale="92500" lnSpcReduction="10000"/>
           </a:bodyPr>
           <a:lstStyle/>
           <a:p>
             <a:r>
-              <a:rPr lang="it-IT" smtClean="0">
-                <a:latin typeface="Cambria Math" pitchFamily="18" charset="0"/>
-                <a:ea typeface="Cambria Math" pitchFamily="18" charset="0"/>
-              </a:rPr>
-              <a:t>Instances C101-C208</a:t>
+              <a:rPr lang="it-IT" dirty="0" err="1" smtClean="0">
+                <a:latin typeface="Cambria Math" pitchFamily="18" charset="0"/>
+                <a:ea typeface="Cambria Math" pitchFamily="18" charset="0"/>
+              </a:rPr>
+              <a:t>Instances</a:t>
+            </a:r>
+            <a:r>
+              <a:rPr lang="it-IT" dirty="0" smtClean="0">
+                <a:latin typeface="Cambria Math" pitchFamily="18" charset="0"/>
+                <a:ea typeface="Cambria Math" pitchFamily="18" charset="0"/>
+              </a:rPr>
+              <a:t> </a:t>
+            </a:r>
+            <a:r>
+              <a:rPr lang="it-IT" dirty="0" smtClean="0">
+                <a:latin typeface="Cambria Math" pitchFamily="18" charset="0"/>
+                <a:ea typeface="Cambria Math" pitchFamily="18" charset="0"/>
+              </a:rPr>
+              <a:t>C101-C208</a:t>
             </a:r>
           </a:p>
           <a:p>
             <a:pPr lvl="1"/>
             <a:r>
-              <a:rPr lang="it-IT" sz="1800" smtClean="0">
-                <a:latin typeface="Cambria Math" pitchFamily="18" charset="0"/>
-                <a:ea typeface="Cambria Math" pitchFamily="18" charset="0"/>
-              </a:rPr>
-              <a:t>Objective Function:</a:t>
+              <a:rPr lang="it-IT" sz="1800" dirty="0" err="1" smtClean="0">
+                <a:latin typeface="Cambria Math" pitchFamily="18" charset="0"/>
+                <a:ea typeface="Cambria Math" pitchFamily="18" charset="0"/>
+              </a:rPr>
+              <a:t>Objective</a:t>
+            </a:r>
+            <a:r>
+              <a:rPr lang="it-IT" sz="1800" dirty="0" smtClean="0">
+                <a:latin typeface="Cambria Math" pitchFamily="18" charset="0"/>
+                <a:ea typeface="Cambria Math" pitchFamily="18" charset="0"/>
+              </a:rPr>
+              <a:t> </a:t>
+            </a:r>
+            <a:r>
+              <a:rPr lang="it-IT" sz="1800" dirty="0" err="1" smtClean="0">
+                <a:latin typeface="Cambria Math" pitchFamily="18" charset="0"/>
+                <a:ea typeface="Cambria Math" pitchFamily="18" charset="0"/>
+              </a:rPr>
+              <a:t>Function</a:t>
+            </a:r>
+            <a:r>
+              <a:rPr lang="it-IT" sz="1800" dirty="0" smtClean="0">
+                <a:latin typeface="Cambria Math" pitchFamily="18" charset="0"/>
+                <a:ea typeface="Cambria Math" pitchFamily="18" charset="0"/>
+              </a:rPr>
+              <a:t>:</a:t>
             </a:r>
           </a:p>
           <a:p>
             <a:pPr lvl="2"/>
             <a:r>
-              <a:rPr lang="it-IT" sz="1600" smtClean="0">
-                <a:latin typeface="Cambria Math" pitchFamily="18" charset="0"/>
-                <a:ea typeface="Cambria Math" pitchFamily="18" charset="0"/>
-              </a:rPr>
-              <a:t>0.45% mean displacement for the </a:t>
-            </a:r>
-            <a:r>
-              <a:rPr lang="it-IT" sz="1600" i="1" smtClean="0">
+              <a:rPr lang="it-IT" sz="1600" dirty="0" smtClean="0">
+                <a:latin typeface="Cambria Math" pitchFamily="18" charset="0"/>
+                <a:ea typeface="Cambria Math" pitchFamily="18" charset="0"/>
+              </a:rPr>
+              <a:t>0.45% </a:t>
+            </a:r>
+            <a:r>
+              <a:rPr lang="it-IT" sz="1600" dirty="0" err="1" smtClean="0">
                 <a:latin typeface="Cambria Math" pitchFamily="18" charset="0"/>
                 <a:ea typeface="Cambria Math" pitchFamily="18" charset="0"/>
               </a:rPr>
               <a:t>mean</a:t>
             </a:r>
+            <a:r>
+              <a:rPr lang="it-IT" sz="1600" dirty="0" smtClean="0">
+                <a:latin typeface="Cambria Math" pitchFamily="18" charset="0"/>
+                <a:ea typeface="Cambria Math" pitchFamily="18" charset="0"/>
+              </a:rPr>
+              <a:t> </a:t>
+            </a:r>
+            <a:r>
+              <a:rPr lang="it-IT" sz="1600" dirty="0" err="1" smtClean="0">
+                <a:latin typeface="Cambria Math" pitchFamily="18" charset="0"/>
+                <a:ea typeface="Cambria Math" pitchFamily="18" charset="0"/>
+              </a:rPr>
+              <a:t>displacement</a:t>
+            </a:r>
+            <a:r>
+              <a:rPr lang="it-IT" sz="1600" dirty="0" smtClean="0">
+                <a:latin typeface="Cambria Math" pitchFamily="18" charset="0"/>
+                <a:ea typeface="Cambria Math" pitchFamily="18" charset="0"/>
+              </a:rPr>
+              <a:t> </a:t>
+            </a:r>
+            <a:r>
+              <a:rPr lang="it-IT" sz="1600" dirty="0" err="1" smtClean="0">
+                <a:latin typeface="Cambria Math" pitchFamily="18" charset="0"/>
+                <a:ea typeface="Cambria Math" pitchFamily="18" charset="0"/>
+              </a:rPr>
+              <a:t>for</a:t>
+            </a:r>
+            <a:r>
+              <a:rPr lang="it-IT" sz="1600" dirty="0" smtClean="0">
+                <a:latin typeface="Cambria Math" pitchFamily="18" charset="0"/>
+                <a:ea typeface="Cambria Math" pitchFamily="18" charset="0"/>
+              </a:rPr>
+              <a:t> the </a:t>
+            </a:r>
+            <a:r>
+              <a:rPr lang="it-IT" sz="1600" i="1" dirty="0" err="1" smtClean="0">
+                <a:latin typeface="Cambria Math" pitchFamily="18" charset="0"/>
+                <a:ea typeface="Cambria Math" pitchFamily="18" charset="0"/>
+              </a:rPr>
+              <a:t>mean</a:t>
+            </a:r>
+            <a:endParaRPr lang="it-IT" sz="1600" i="1" dirty="0" smtClean="0">
+              <a:latin typeface="Cambria Math" pitchFamily="18" charset="0"/>
+              <a:ea typeface="Cambria Math" pitchFamily="18" charset="0"/>
+            </a:endParaRPr>
           </a:p>
           <a:p>
             <a:pPr lvl="2"/>
             <a:r>
-              <a:rPr lang="it-IT" sz="1600" smtClean="0">
-                <a:latin typeface="Cambria Math" pitchFamily="18" charset="0"/>
-                <a:ea typeface="Cambria Math" pitchFamily="18" charset="0"/>
-              </a:rPr>
-              <a:t>0.31% mean displacement for the </a:t>
-            </a:r>
-            <a:r>
-              <a:rPr lang="it-IT" sz="1600" i="1" smtClean="0">
+              <a:rPr lang="it-IT" sz="1600" dirty="0" smtClean="0">
+                <a:latin typeface="Cambria Math" pitchFamily="18" charset="0"/>
+                <a:ea typeface="Cambria Math" pitchFamily="18" charset="0"/>
+              </a:rPr>
+              <a:t>0.31% </a:t>
+            </a:r>
+            <a:r>
+              <a:rPr lang="it-IT" sz="1600" dirty="0" err="1" smtClean="0">
+                <a:latin typeface="Cambria Math" pitchFamily="18" charset="0"/>
+                <a:ea typeface="Cambria Math" pitchFamily="18" charset="0"/>
+              </a:rPr>
+              <a:t>mean</a:t>
+            </a:r>
+            <a:r>
+              <a:rPr lang="it-IT" sz="1600" dirty="0" smtClean="0">
+                <a:latin typeface="Cambria Math" pitchFamily="18" charset="0"/>
+                <a:ea typeface="Cambria Math" pitchFamily="18" charset="0"/>
+              </a:rPr>
+              <a:t> </a:t>
+            </a:r>
+            <a:r>
+              <a:rPr lang="it-IT" sz="1600" dirty="0" err="1" smtClean="0">
+                <a:latin typeface="Cambria Math" pitchFamily="18" charset="0"/>
+                <a:ea typeface="Cambria Math" pitchFamily="18" charset="0"/>
+              </a:rPr>
+              <a:t>displacement</a:t>
+            </a:r>
+            <a:r>
+              <a:rPr lang="it-IT" sz="1600" dirty="0" smtClean="0">
+                <a:latin typeface="Cambria Math" pitchFamily="18" charset="0"/>
+                <a:ea typeface="Cambria Math" pitchFamily="18" charset="0"/>
+              </a:rPr>
+              <a:t> </a:t>
+            </a:r>
+            <a:r>
+              <a:rPr lang="it-IT" sz="1600" dirty="0" err="1" smtClean="0">
+                <a:latin typeface="Cambria Math" pitchFamily="18" charset="0"/>
+                <a:ea typeface="Cambria Math" pitchFamily="18" charset="0"/>
+              </a:rPr>
+              <a:t>for</a:t>
+            </a:r>
+            <a:r>
+              <a:rPr lang="it-IT" sz="1600" dirty="0" smtClean="0">
+                <a:latin typeface="Cambria Math" pitchFamily="18" charset="0"/>
+                <a:ea typeface="Cambria Math" pitchFamily="18" charset="0"/>
+              </a:rPr>
+              <a:t> the </a:t>
+            </a:r>
+            <a:r>
+              <a:rPr lang="it-IT" sz="1600" i="1" dirty="0" smtClean="0">
                 <a:latin typeface="Cambria Math" pitchFamily="18" charset="0"/>
                 <a:ea typeface="Cambria Math" pitchFamily="18" charset="0"/>
               </a:rPr>
@@ -6717,89 +7017,329 @@
           <a:p>
             <a:pPr lvl="1"/>
             <a:r>
-              <a:rPr lang="it-IT" sz="1800" smtClean="0">
-                <a:latin typeface="Cambria Math" pitchFamily="18" charset="0"/>
-                <a:ea typeface="Cambria Math" pitchFamily="18" charset="0"/>
-              </a:rPr>
-              <a:t>Optimal number of vehicles</a:t>
-            </a:r>
+              <a:rPr lang="it-IT" sz="1800" dirty="0" err="1" smtClean="0">
+                <a:latin typeface="Cambria Math" pitchFamily="18" charset="0"/>
+                <a:ea typeface="Cambria Math" pitchFamily="18" charset="0"/>
+              </a:rPr>
+              <a:t>Optimal</a:t>
+            </a:r>
+            <a:r>
+              <a:rPr lang="it-IT" sz="1800" dirty="0" smtClean="0">
+                <a:latin typeface="Cambria Math" pitchFamily="18" charset="0"/>
+                <a:ea typeface="Cambria Math" pitchFamily="18" charset="0"/>
+              </a:rPr>
+              <a:t> </a:t>
+            </a:r>
+            <a:r>
+              <a:rPr lang="it-IT" sz="1800" dirty="0" err="1" smtClean="0">
+                <a:latin typeface="Cambria Math" pitchFamily="18" charset="0"/>
+                <a:ea typeface="Cambria Math" pitchFamily="18" charset="0"/>
+              </a:rPr>
+              <a:t>number</a:t>
+            </a:r>
+            <a:r>
+              <a:rPr lang="it-IT" sz="1800" dirty="0" smtClean="0">
+                <a:latin typeface="Cambria Math" pitchFamily="18" charset="0"/>
+                <a:ea typeface="Cambria Math" pitchFamily="18" charset="0"/>
+              </a:rPr>
+              <a:t> </a:t>
+            </a:r>
+            <a:r>
+              <a:rPr lang="it-IT" sz="1800" dirty="0" err="1" smtClean="0">
+                <a:latin typeface="Cambria Math" pitchFamily="18" charset="0"/>
+                <a:ea typeface="Cambria Math" pitchFamily="18" charset="0"/>
+              </a:rPr>
+              <a:t>of</a:t>
+            </a:r>
+            <a:r>
+              <a:rPr lang="it-IT" sz="1800" dirty="0" smtClean="0">
+                <a:latin typeface="Cambria Math" pitchFamily="18" charset="0"/>
+                <a:ea typeface="Cambria Math" pitchFamily="18" charset="0"/>
+              </a:rPr>
+              <a:t> </a:t>
+            </a:r>
+            <a:r>
+              <a:rPr lang="it-IT" sz="1800" dirty="0" err="1" smtClean="0">
+                <a:latin typeface="Cambria Math" pitchFamily="18" charset="0"/>
+                <a:ea typeface="Cambria Math" pitchFamily="18" charset="0"/>
+              </a:rPr>
+              <a:t>vehicles</a:t>
+            </a:r>
+            <a:endParaRPr lang="it-IT" sz="1800" dirty="0" smtClean="0">
+              <a:latin typeface="Cambria Math" pitchFamily="18" charset="0"/>
+              <a:ea typeface="Cambria Math" pitchFamily="18" charset="0"/>
+            </a:endParaRPr>
           </a:p>
           <a:p>
             <a:pPr lvl="1"/>
             <a:r>
-              <a:rPr lang="it-IT" sz="1800" smtClean="0">
-                <a:latin typeface="Cambria Math" pitchFamily="18" charset="0"/>
-                <a:ea typeface="Cambria Math" pitchFamily="18" charset="0"/>
-              </a:rPr>
-              <a:t>39.49s mean execution time</a:t>
-            </a:r>
+              <a:rPr lang="it-IT" sz="1800" dirty="0" smtClean="0">
+                <a:latin typeface="Cambria Math" pitchFamily="18" charset="0"/>
+                <a:ea typeface="Cambria Math" pitchFamily="18" charset="0"/>
+              </a:rPr>
+              <a:t>39.49s </a:t>
+            </a:r>
+            <a:r>
+              <a:rPr lang="it-IT" sz="1800" dirty="0" err="1" smtClean="0">
+                <a:latin typeface="Cambria Math" pitchFamily="18" charset="0"/>
+                <a:ea typeface="Cambria Math" pitchFamily="18" charset="0"/>
+              </a:rPr>
+              <a:t>mean</a:t>
+            </a:r>
+            <a:r>
+              <a:rPr lang="it-IT" sz="1800" dirty="0" smtClean="0">
+                <a:latin typeface="Cambria Math" pitchFamily="18" charset="0"/>
+                <a:ea typeface="Cambria Math" pitchFamily="18" charset="0"/>
+              </a:rPr>
+              <a:t> </a:t>
+            </a:r>
+            <a:r>
+              <a:rPr lang="it-IT" sz="1800" dirty="0" err="1" smtClean="0">
+                <a:latin typeface="Cambria Math" pitchFamily="18" charset="0"/>
+                <a:ea typeface="Cambria Math" pitchFamily="18" charset="0"/>
+              </a:rPr>
+              <a:t>execution</a:t>
+            </a:r>
+            <a:r>
+              <a:rPr lang="it-IT" sz="1800" dirty="0" smtClean="0">
+                <a:latin typeface="Cambria Math" pitchFamily="18" charset="0"/>
+                <a:ea typeface="Cambria Math" pitchFamily="18" charset="0"/>
+              </a:rPr>
+              <a:t> </a:t>
+            </a:r>
+            <a:r>
+              <a:rPr lang="it-IT" sz="1800" dirty="0" err="1" smtClean="0">
+                <a:latin typeface="Cambria Math" pitchFamily="18" charset="0"/>
+                <a:ea typeface="Cambria Math" pitchFamily="18" charset="0"/>
+              </a:rPr>
+              <a:t>time</a:t>
+            </a:r>
+            <a:endParaRPr lang="it-IT" sz="1800" dirty="0" smtClean="0">
+              <a:latin typeface="Cambria Math" pitchFamily="18" charset="0"/>
+              <a:ea typeface="Cambria Math" pitchFamily="18" charset="0"/>
+            </a:endParaRPr>
           </a:p>
           <a:p>
             <a:pPr lvl="1"/>
             <a:r>
-              <a:rPr lang="it-IT" sz="1800" smtClean="0">
-                <a:latin typeface="Cambria Math" pitchFamily="18" charset="0"/>
-                <a:ea typeface="Cambria Math" pitchFamily="18" charset="0"/>
-              </a:rPr>
-              <a:t>C204 only oscillating exception</a:t>
-            </a:r>
+              <a:rPr lang="it-IT" sz="1800" dirty="0" smtClean="0">
+                <a:latin typeface="Cambria Math" pitchFamily="18" charset="0"/>
+                <a:ea typeface="Cambria Math" pitchFamily="18" charset="0"/>
+              </a:rPr>
+              <a:t>C204 </a:t>
+            </a:r>
+            <a:r>
+              <a:rPr lang="it-IT" sz="1800" dirty="0" err="1" smtClean="0">
+                <a:latin typeface="Cambria Math" pitchFamily="18" charset="0"/>
+                <a:ea typeface="Cambria Math" pitchFamily="18" charset="0"/>
+              </a:rPr>
+              <a:t>only</a:t>
+            </a:r>
+            <a:r>
+              <a:rPr lang="it-IT" sz="1800" dirty="0" smtClean="0">
+                <a:latin typeface="Cambria Math" pitchFamily="18" charset="0"/>
+                <a:ea typeface="Cambria Math" pitchFamily="18" charset="0"/>
+              </a:rPr>
+              <a:t> </a:t>
+            </a:r>
+            <a:r>
+              <a:rPr lang="it-IT" sz="1800" dirty="0" err="1" smtClean="0">
+                <a:latin typeface="Cambria Math" pitchFamily="18" charset="0"/>
+                <a:ea typeface="Cambria Math" pitchFamily="18" charset="0"/>
+              </a:rPr>
+              <a:t>oscillating</a:t>
+            </a:r>
+            <a:r>
+              <a:rPr lang="it-IT" sz="1800" dirty="0" smtClean="0">
+                <a:latin typeface="Cambria Math" pitchFamily="18" charset="0"/>
+                <a:ea typeface="Cambria Math" pitchFamily="18" charset="0"/>
+              </a:rPr>
+              <a:t> </a:t>
+            </a:r>
+            <a:r>
+              <a:rPr lang="it-IT" sz="1800" dirty="0" err="1" smtClean="0">
+                <a:latin typeface="Cambria Math" pitchFamily="18" charset="0"/>
+                <a:ea typeface="Cambria Math" pitchFamily="18" charset="0"/>
+              </a:rPr>
+              <a:t>exception</a:t>
+            </a:r>
+            <a:endParaRPr lang="it-IT" sz="1800" dirty="0" smtClean="0">
+              <a:latin typeface="Cambria Math" pitchFamily="18" charset="0"/>
+              <a:ea typeface="Cambria Math" pitchFamily="18" charset="0"/>
+            </a:endParaRPr>
           </a:p>
           <a:p>
             <a:pPr lvl="1">
               <a:buNone/>
             </a:pPr>
-            <a:endParaRPr lang="it-IT" smtClean="0">
+            <a:endParaRPr lang="it-IT" dirty="0" smtClean="0">
               <a:latin typeface="Cambria Math" pitchFamily="18" charset="0"/>
               <a:ea typeface="Cambria Math" pitchFamily="18" charset="0"/>
             </a:endParaRPr>
           </a:p>
           <a:p>
             <a:r>
-              <a:rPr lang="it-IT" smtClean="0">
-                <a:latin typeface="Cambria Math" pitchFamily="18" charset="0"/>
-                <a:ea typeface="Cambria Math" pitchFamily="18" charset="0"/>
-              </a:rPr>
-              <a:t>Instances RC101-RC208</a:t>
+              <a:rPr lang="it-IT" dirty="0" err="1" smtClean="0">
+                <a:latin typeface="Cambria Math" pitchFamily="18" charset="0"/>
+                <a:ea typeface="Cambria Math" pitchFamily="18" charset="0"/>
+              </a:rPr>
+              <a:t>Instances</a:t>
+            </a:r>
+            <a:r>
+              <a:rPr lang="it-IT" dirty="0" smtClean="0">
+                <a:latin typeface="Cambria Math" pitchFamily="18" charset="0"/>
+                <a:ea typeface="Cambria Math" pitchFamily="18" charset="0"/>
+              </a:rPr>
+              <a:t> RC101-RC208</a:t>
             </a:r>
           </a:p>
           <a:p>
             <a:pPr lvl="1"/>
             <a:r>
-              <a:rPr lang="it-IT" smtClean="0">
-                <a:latin typeface="Cambria Math" pitchFamily="18" charset="0"/>
-                <a:ea typeface="Cambria Math" pitchFamily="18" charset="0"/>
-              </a:rPr>
-              <a:t>Objective Function:</a:t>
+              <a:rPr lang="it-IT" dirty="0" err="1" smtClean="0">
+                <a:latin typeface="Cambria Math" pitchFamily="18" charset="0"/>
+                <a:ea typeface="Cambria Math" pitchFamily="18" charset="0"/>
+              </a:rPr>
+              <a:t>Objective</a:t>
+            </a:r>
+            <a:r>
+              <a:rPr lang="it-IT" dirty="0" smtClean="0">
+                <a:latin typeface="Cambria Math" pitchFamily="18" charset="0"/>
+                <a:ea typeface="Cambria Math" pitchFamily="18" charset="0"/>
+              </a:rPr>
+              <a:t> </a:t>
+            </a:r>
+            <a:r>
+              <a:rPr lang="it-IT" dirty="0" err="1" smtClean="0">
+                <a:latin typeface="Cambria Math" pitchFamily="18" charset="0"/>
+                <a:ea typeface="Cambria Math" pitchFamily="18" charset="0"/>
+              </a:rPr>
+              <a:t>Function</a:t>
+            </a:r>
+            <a:r>
+              <a:rPr lang="it-IT" dirty="0" smtClean="0">
+                <a:latin typeface="Cambria Math" pitchFamily="18" charset="0"/>
+                <a:ea typeface="Cambria Math" pitchFamily="18" charset="0"/>
+              </a:rPr>
+              <a:t>:</a:t>
             </a:r>
           </a:p>
           <a:p>
             <a:pPr lvl="2"/>
             <a:r>
-              <a:rPr lang="it-IT" smtClean="0">
-                <a:latin typeface="Cambria Math" pitchFamily="18" charset="0"/>
-                <a:ea typeface="Cambria Math" pitchFamily="18" charset="0"/>
-              </a:rPr>
-              <a:t>3.15% mean displacement for the </a:t>
-            </a:r>
-            <a:r>
-              <a:rPr lang="it-IT" i="1" smtClean="0">
+              <a:rPr lang="it-IT" dirty="0" smtClean="0">
+                <a:latin typeface="Cambria Math" pitchFamily="18" charset="0"/>
+                <a:ea typeface="Cambria Math" pitchFamily="18" charset="0"/>
+              </a:rPr>
+              <a:t>3.15% </a:t>
+            </a:r>
+            <a:r>
+              <a:rPr lang="it-IT" dirty="0" err="1" smtClean="0">
                 <a:latin typeface="Cambria Math" pitchFamily="18" charset="0"/>
                 <a:ea typeface="Cambria Math" pitchFamily="18" charset="0"/>
               </a:rPr>
               <a:t>mean</a:t>
             </a:r>
+            <a:r>
+              <a:rPr lang="it-IT" dirty="0" smtClean="0">
+                <a:latin typeface="Cambria Math" pitchFamily="18" charset="0"/>
+                <a:ea typeface="Cambria Math" pitchFamily="18" charset="0"/>
+              </a:rPr>
+              <a:t> </a:t>
+            </a:r>
+            <a:r>
+              <a:rPr lang="it-IT" dirty="0" err="1" smtClean="0">
+                <a:latin typeface="Cambria Math" pitchFamily="18" charset="0"/>
+                <a:ea typeface="Cambria Math" pitchFamily="18" charset="0"/>
+              </a:rPr>
+              <a:t>displacement</a:t>
+            </a:r>
+            <a:r>
+              <a:rPr lang="it-IT" dirty="0" smtClean="0">
+                <a:latin typeface="Cambria Math" pitchFamily="18" charset="0"/>
+                <a:ea typeface="Cambria Math" pitchFamily="18" charset="0"/>
+              </a:rPr>
+              <a:t> </a:t>
+            </a:r>
+            <a:r>
+              <a:rPr lang="it-IT" dirty="0" err="1" smtClean="0">
+                <a:latin typeface="Cambria Math" pitchFamily="18" charset="0"/>
+                <a:ea typeface="Cambria Math" pitchFamily="18" charset="0"/>
+              </a:rPr>
+              <a:t>for</a:t>
+            </a:r>
+            <a:r>
+              <a:rPr lang="it-IT" dirty="0" smtClean="0">
+                <a:latin typeface="Cambria Math" pitchFamily="18" charset="0"/>
+                <a:ea typeface="Cambria Math" pitchFamily="18" charset="0"/>
+              </a:rPr>
+              <a:t> the </a:t>
+            </a:r>
+            <a:r>
+              <a:rPr lang="it-IT" i="1" dirty="0" err="1" smtClean="0">
+                <a:latin typeface="Cambria Math" pitchFamily="18" charset="0"/>
+                <a:ea typeface="Cambria Math" pitchFamily="18" charset="0"/>
+              </a:rPr>
+              <a:t>mean</a:t>
+            </a:r>
+            <a:endParaRPr lang="it-IT" i="1" dirty="0" smtClean="0">
+              <a:latin typeface="Cambria Math" pitchFamily="18" charset="0"/>
+              <a:ea typeface="Cambria Math" pitchFamily="18" charset="0"/>
+            </a:endParaRPr>
           </a:p>
           <a:p>
             <a:pPr lvl="2"/>
             <a:r>
-              <a:rPr lang="it-IT" smtClean="0">
-                <a:latin typeface="Cambria Math" pitchFamily="18" charset="0"/>
-                <a:ea typeface="Cambria Math" pitchFamily="18" charset="0"/>
-              </a:rPr>
-              <a:t>1.44% mean displacement for the </a:t>
-            </a:r>
-            <a:r>
-              <a:rPr lang="it-IT" i="1" smtClean="0">
+              <a:rPr lang="it-IT" dirty="0" smtClean="0">
+                <a:latin typeface="Cambria Math" pitchFamily="18" charset="0"/>
+                <a:ea typeface="Cambria Math" pitchFamily="18" charset="0"/>
+              </a:rPr>
+              <a:t>1.44% </a:t>
+            </a:r>
+            <a:r>
+              <a:rPr lang="it-IT" dirty="0" err="1" smtClean="0">
+                <a:latin typeface="Cambria Math" pitchFamily="18" charset="0"/>
+                <a:ea typeface="Cambria Math" pitchFamily="18" charset="0"/>
+              </a:rPr>
+              <a:t>mean</a:t>
+            </a:r>
+            <a:r>
+              <a:rPr lang="it-IT" dirty="0" smtClean="0">
+                <a:latin typeface="Cambria Math" pitchFamily="18" charset="0"/>
+                <a:ea typeface="Cambria Math" pitchFamily="18" charset="0"/>
+              </a:rPr>
+              <a:t> </a:t>
+            </a:r>
+            <a:r>
+              <a:rPr lang="it-IT" dirty="0" err="1" smtClean="0">
+                <a:latin typeface="Cambria Math" pitchFamily="18" charset="0"/>
+                <a:ea typeface="Cambria Math" pitchFamily="18" charset="0"/>
+              </a:rPr>
+              <a:t>displacement</a:t>
+            </a:r>
+            <a:r>
+              <a:rPr lang="it-IT" dirty="0" smtClean="0">
+                <a:latin typeface="Cambria Math" pitchFamily="18" charset="0"/>
+                <a:ea typeface="Cambria Math" pitchFamily="18" charset="0"/>
+              </a:rPr>
+              <a:t> </a:t>
+            </a:r>
+            <a:r>
+              <a:rPr lang="it-IT" dirty="0" err="1" smtClean="0">
+                <a:latin typeface="Cambria Math" pitchFamily="18" charset="0"/>
+                <a:ea typeface="Cambria Math" pitchFamily="18" charset="0"/>
+              </a:rPr>
+              <a:t>for</a:t>
+            </a:r>
+            <a:r>
+              <a:rPr lang="it-IT" dirty="0" smtClean="0">
+                <a:latin typeface="Cambria Math" pitchFamily="18" charset="0"/>
+                <a:ea typeface="Cambria Math" pitchFamily="18" charset="0"/>
+              </a:rPr>
+              <a:t> the </a:t>
+            </a:r>
+            <a:r>
+              <a:rPr lang="it-IT" i="1" dirty="0" smtClean="0">
                 <a:latin typeface="Cambria Math" pitchFamily="18" charset="0"/>
                 <a:ea typeface="Cambria Math" pitchFamily="18" charset="0"/>
               </a:rPr>
@@ -6809,38 +7349,193 @@
           <a:p>
             <a:pPr lvl="1"/>
             <a:r>
-              <a:rPr lang="it-IT" sz="1800" smtClean="0">
-                <a:latin typeface="Cambria Math" pitchFamily="18" charset="0"/>
-                <a:ea typeface="Cambria Math" pitchFamily="18" charset="0"/>
-              </a:rPr>
-              <a:t>Slightly oscillating number of vehicles </a:t>
+              <a:rPr lang="it-IT" sz="1800" dirty="0" err="1" smtClean="0">
+                <a:latin typeface="Cambria Math" pitchFamily="18" charset="0"/>
+                <a:ea typeface="Cambria Math" pitchFamily="18" charset="0"/>
+              </a:rPr>
+              <a:t>Slightly</a:t>
+            </a:r>
+            <a:r>
+              <a:rPr lang="it-IT" sz="1800" dirty="0" smtClean="0">
+                <a:latin typeface="Cambria Math" pitchFamily="18" charset="0"/>
+                <a:ea typeface="Cambria Math" pitchFamily="18" charset="0"/>
+              </a:rPr>
+              <a:t> </a:t>
+            </a:r>
+            <a:r>
+              <a:rPr lang="it-IT" sz="1800" dirty="0" err="1" smtClean="0">
+                <a:latin typeface="Cambria Math" pitchFamily="18" charset="0"/>
+                <a:ea typeface="Cambria Math" pitchFamily="18" charset="0"/>
+              </a:rPr>
+              <a:t>oscillating</a:t>
+            </a:r>
+            <a:r>
+              <a:rPr lang="it-IT" sz="1800" dirty="0" smtClean="0">
+                <a:latin typeface="Cambria Math" pitchFamily="18" charset="0"/>
+                <a:ea typeface="Cambria Math" pitchFamily="18" charset="0"/>
+              </a:rPr>
+              <a:t> </a:t>
+            </a:r>
+            <a:r>
+              <a:rPr lang="it-IT" sz="1800" dirty="0" err="1" smtClean="0">
+                <a:latin typeface="Cambria Math" pitchFamily="18" charset="0"/>
+                <a:ea typeface="Cambria Math" pitchFamily="18" charset="0"/>
+              </a:rPr>
+              <a:t>number</a:t>
+            </a:r>
+            <a:r>
+              <a:rPr lang="it-IT" sz="1800" dirty="0" smtClean="0">
+                <a:latin typeface="Cambria Math" pitchFamily="18" charset="0"/>
+                <a:ea typeface="Cambria Math" pitchFamily="18" charset="0"/>
+              </a:rPr>
+              <a:t> </a:t>
+            </a:r>
+            <a:r>
+              <a:rPr lang="it-IT" sz="1800" dirty="0" err="1" smtClean="0">
+                <a:latin typeface="Cambria Math" pitchFamily="18" charset="0"/>
+                <a:ea typeface="Cambria Math" pitchFamily="18" charset="0"/>
+              </a:rPr>
+              <a:t>of</a:t>
+            </a:r>
+            <a:r>
+              <a:rPr lang="it-IT" sz="1800" dirty="0" smtClean="0">
+                <a:latin typeface="Cambria Math" pitchFamily="18" charset="0"/>
+                <a:ea typeface="Cambria Math" pitchFamily="18" charset="0"/>
+              </a:rPr>
+              <a:t> </a:t>
+            </a:r>
+            <a:r>
+              <a:rPr lang="it-IT" sz="1800" dirty="0" err="1" smtClean="0">
+                <a:latin typeface="Cambria Math" pitchFamily="18" charset="0"/>
+                <a:ea typeface="Cambria Math" pitchFamily="18" charset="0"/>
+              </a:rPr>
+              <a:t>vehicles</a:t>
+            </a:r>
+            <a:r>
+              <a:rPr lang="it-IT" sz="1800" dirty="0" smtClean="0">
+                <a:latin typeface="Cambria Math" pitchFamily="18" charset="0"/>
+                <a:ea typeface="Cambria Math" pitchFamily="18" charset="0"/>
+              </a:rPr>
+              <a:t> </a:t>
             </a:r>
           </a:p>
           <a:p>
             <a:pPr lvl="1"/>
             <a:r>
-              <a:rPr lang="it-IT" sz="1800" smtClean="0">
-                <a:latin typeface="Cambria Math" pitchFamily="18" charset="0"/>
-                <a:ea typeface="Cambria Math" pitchFamily="18" charset="0"/>
-              </a:rPr>
-              <a:t>46.33s mean execution time</a:t>
-            </a:r>
+              <a:rPr lang="it-IT" sz="1800" dirty="0" smtClean="0">
+                <a:latin typeface="Cambria Math" pitchFamily="18" charset="0"/>
+                <a:ea typeface="Cambria Math" pitchFamily="18" charset="0"/>
+              </a:rPr>
+              <a:t>46.33s </a:t>
+            </a:r>
+            <a:r>
+              <a:rPr lang="it-IT" sz="1800" dirty="0" err="1" smtClean="0">
+                <a:latin typeface="Cambria Math" pitchFamily="18" charset="0"/>
+                <a:ea typeface="Cambria Math" pitchFamily="18" charset="0"/>
+              </a:rPr>
+              <a:t>mean</a:t>
+            </a:r>
+            <a:r>
+              <a:rPr lang="it-IT" sz="1800" dirty="0" smtClean="0">
+                <a:latin typeface="Cambria Math" pitchFamily="18" charset="0"/>
+                <a:ea typeface="Cambria Math" pitchFamily="18" charset="0"/>
+              </a:rPr>
+              <a:t> </a:t>
+            </a:r>
+            <a:r>
+              <a:rPr lang="it-IT" sz="1800" dirty="0" err="1" smtClean="0">
+                <a:latin typeface="Cambria Math" pitchFamily="18" charset="0"/>
+                <a:ea typeface="Cambria Math" pitchFamily="18" charset="0"/>
+              </a:rPr>
+              <a:t>execution</a:t>
+            </a:r>
+            <a:r>
+              <a:rPr lang="it-IT" sz="1800" dirty="0" smtClean="0">
+                <a:latin typeface="Cambria Math" pitchFamily="18" charset="0"/>
+                <a:ea typeface="Cambria Math" pitchFamily="18" charset="0"/>
+              </a:rPr>
+              <a:t> </a:t>
+            </a:r>
+            <a:r>
+              <a:rPr lang="it-IT" sz="1800" dirty="0" err="1" smtClean="0">
+                <a:latin typeface="Cambria Math" pitchFamily="18" charset="0"/>
+                <a:ea typeface="Cambria Math" pitchFamily="18" charset="0"/>
+              </a:rPr>
+              <a:t>time</a:t>
+            </a:r>
+            <a:endParaRPr lang="it-IT" sz="1800" dirty="0" smtClean="0">
+              <a:latin typeface="Cambria Math" pitchFamily="18" charset="0"/>
+              <a:ea typeface="Cambria Math" pitchFamily="18" charset="0"/>
+            </a:endParaRPr>
           </a:p>
           <a:p>
             <a:pPr lvl="1"/>
             <a:r>
-              <a:rPr lang="it-IT" sz="1800" smtClean="0">
-                <a:latin typeface="Cambria Math" pitchFamily="18" charset="0"/>
-                <a:ea typeface="Cambria Math" pitchFamily="18" charset="0"/>
-              </a:rPr>
-              <a:t>RC104 and RC107 istances with worst behavior</a:t>
-            </a:r>
+              <a:rPr lang="it-IT" sz="1800" dirty="0" smtClean="0">
+                <a:latin typeface="Cambria Math" pitchFamily="18" charset="0"/>
+                <a:ea typeface="Cambria Math" pitchFamily="18" charset="0"/>
+              </a:rPr>
+              <a:t>RC104 and RC107 </a:t>
+            </a:r>
+            <a:r>
+              <a:rPr lang="it-IT" sz="1800" dirty="0" err="1" smtClean="0">
+                <a:latin typeface="Cambria Math" pitchFamily="18" charset="0"/>
+                <a:ea typeface="Cambria Math" pitchFamily="18" charset="0"/>
+              </a:rPr>
+              <a:t>istances</a:t>
+            </a:r>
+            <a:r>
+              <a:rPr lang="it-IT" sz="1800" dirty="0" smtClean="0">
+                <a:latin typeface="Cambria Math" pitchFamily="18" charset="0"/>
+                <a:ea typeface="Cambria Math" pitchFamily="18" charset="0"/>
+              </a:rPr>
+              <a:t> </a:t>
+            </a:r>
+            <a:r>
+              <a:rPr lang="it-IT" sz="1800" dirty="0" err="1" smtClean="0">
+                <a:latin typeface="Cambria Math" pitchFamily="18" charset="0"/>
+                <a:ea typeface="Cambria Math" pitchFamily="18" charset="0"/>
+              </a:rPr>
+              <a:t>with</a:t>
+            </a:r>
+            <a:r>
+              <a:rPr lang="it-IT" sz="1800" dirty="0" smtClean="0">
+                <a:latin typeface="Cambria Math" pitchFamily="18" charset="0"/>
+                <a:ea typeface="Cambria Math" pitchFamily="18" charset="0"/>
+              </a:rPr>
+              <a:t> </a:t>
+            </a:r>
+            <a:r>
+              <a:rPr lang="it-IT" sz="1800" dirty="0" err="1" smtClean="0">
+                <a:latin typeface="Cambria Math" pitchFamily="18" charset="0"/>
+                <a:ea typeface="Cambria Math" pitchFamily="18" charset="0"/>
+              </a:rPr>
+              <a:t>worst</a:t>
+            </a:r>
+            <a:r>
+              <a:rPr lang="it-IT" sz="1800" dirty="0" smtClean="0">
+                <a:latin typeface="Cambria Math" pitchFamily="18" charset="0"/>
+                <a:ea typeface="Cambria Math" pitchFamily="18" charset="0"/>
+              </a:rPr>
+              <a:t> </a:t>
+            </a:r>
+            <a:r>
+              <a:rPr lang="it-IT" sz="1800" dirty="0" err="1" smtClean="0">
+                <a:latin typeface="Cambria Math" pitchFamily="18" charset="0"/>
+                <a:ea typeface="Cambria Math" pitchFamily="18" charset="0"/>
+              </a:rPr>
+              <a:t>behavior</a:t>
+            </a:r>
+            <a:endParaRPr lang="it-IT" sz="1800" dirty="0" smtClean="0">
+              <a:latin typeface="Cambria Math" pitchFamily="18" charset="0"/>
+              <a:ea typeface="Cambria Math" pitchFamily="18" charset="0"/>
+            </a:endParaRPr>
           </a:p>
           <a:p>
             <a:pPr lvl="2">
               <a:buNone/>
             </a:pPr>
-            <a:endParaRPr lang="it-IT" i="1" smtClean="0">
+            <a:endParaRPr lang="it-IT" i="1" dirty="0" smtClean="0">
               <a:latin typeface="Cambria Math" pitchFamily="18" charset="0"/>
               <a:ea typeface="Cambria Math" pitchFamily="18" charset="0"/>
             </a:endParaRPr>
@@ -7082,10 +7777,6 @@
               </a:rPr>
               <a:t>Prevents the algorithm from completely deleting routes, thus granting the fixed fleet constraint</a:t>
             </a:r>
-            <a:endParaRPr lang="en-US" smtClean="0">
-              <a:latin typeface="Cambria Math" pitchFamily="18" charset="0"/>
-              <a:ea typeface="Cambria Math" pitchFamily="18" charset="0"/>
-            </a:endParaRPr>
           </a:p>
           <a:p>
             <a:r>
@@ -7159,7 +7850,7 @@
     </p:spTree>
     <p:extLst>
       <p:ext uri="{BB962C8B-B14F-4D97-AF65-F5344CB8AC3E}">
-        <p14:creationId xmlns:p14="http://schemas.microsoft.com/office/powerpoint/2010/main" xmlns="" val="4008755238"/>
+        <p14:creationId xmlns="" xmlns:p14="http://schemas.microsoft.com/office/powerpoint/2010/main" val="4008755238"/>
       </p:ext>
     </p:extLst>
   </p:cSld>
@@ -7215,13 +7906,6 @@
               </a:rPr>
               <a:t>VRPTW with FIXED FLEET SOLVER </a:t>
             </a:r>
-            <a:r>
-              <a:rPr lang="it-IT" smtClean="0">
-                <a:latin typeface="Cambria Math" pitchFamily="18" charset="0"/>
-                <a:ea typeface="Cambria Math" pitchFamily="18" charset="0"/>
-              </a:rPr>
-              <a:t/>
-            </a:r>
             <a:br>
               <a:rPr lang="it-IT" smtClean="0">
                 <a:latin typeface="Cambria Math" pitchFamily="18" charset="0"/>
@@ -7263,7 +7947,7 @@
               </a:lnSpc>
               <a:buNone/>
             </a:pPr>
-            <a:endParaRPr lang="it-IT" smtClean="0"/>
+            <a:endParaRPr lang="it-IT" dirty="0" smtClean="0"/>
           </a:p>
           <a:p>
             <a:pPr>
@@ -7272,12 +7956,23 @@
               </a:lnSpc>
             </a:pPr>
             <a:r>
-              <a:rPr lang="it-IT" smtClean="0">
-                <a:latin typeface="Cambria Math" pitchFamily="18" charset="0"/>
-                <a:ea typeface="Cambria Math" pitchFamily="18" charset="0"/>
-              </a:rPr>
-              <a:t>5000 Iterations</a:t>
-            </a:r>
+              <a:rPr lang="it-IT" dirty="0" smtClean="0">
+                <a:latin typeface="Cambria Math" pitchFamily="18" charset="0"/>
+                <a:ea typeface="Cambria Math" pitchFamily="18" charset="0"/>
+              </a:rPr>
+              <a:t>5000 </a:t>
+            </a:r>
+            <a:r>
+              <a:rPr lang="it-IT" dirty="0" err="1" smtClean="0">
+                <a:latin typeface="Cambria Math" pitchFamily="18" charset="0"/>
+                <a:ea typeface="Cambria Math" pitchFamily="18" charset="0"/>
+              </a:rPr>
+              <a:t>Iterations</a:t>
+            </a:r>
+            <a:endParaRPr lang="it-IT" dirty="0" smtClean="0">
+              <a:latin typeface="Cambria Math" pitchFamily="18" charset="0"/>
+              <a:ea typeface="Cambria Math" pitchFamily="18" charset="0"/>
+            </a:endParaRPr>
           </a:p>
           <a:p>
             <a:pPr>
@@ -7286,12 +7981,72 @@
               </a:lnSpc>
             </a:pPr>
             <a:r>
-              <a:rPr lang="it-IT" smtClean="0">
-                <a:latin typeface="Cambria Math" pitchFamily="18" charset="0"/>
-                <a:ea typeface="Cambria Math" pitchFamily="18" charset="0"/>
-              </a:rPr>
-              <a:t>Regret Insertion for the initial construction</a:t>
-            </a:r>
+              <a:rPr lang="it-IT" dirty="0" err="1" smtClean="0">
+                <a:latin typeface="Cambria Math" pitchFamily="18" charset="0"/>
+                <a:ea typeface="Cambria Math" pitchFamily="18" charset="0"/>
+              </a:rPr>
+              <a:t>Regret</a:t>
+            </a:r>
+            <a:r>
+              <a:rPr lang="it-IT" dirty="0" smtClean="0">
+                <a:latin typeface="Cambria Math" pitchFamily="18" charset="0"/>
+                <a:ea typeface="Cambria Math" pitchFamily="18" charset="0"/>
+              </a:rPr>
+              <a:t> </a:t>
+            </a:r>
+            <a:r>
+              <a:rPr lang="it-IT" dirty="0" err="1" smtClean="0">
+                <a:latin typeface="Cambria Math" pitchFamily="18" charset="0"/>
+                <a:ea typeface="Cambria Math" pitchFamily="18" charset="0"/>
+              </a:rPr>
+              <a:t>Insertion</a:t>
+            </a:r>
+            <a:r>
+              <a:rPr lang="it-IT" dirty="0" smtClean="0">
+                <a:latin typeface="Cambria Math" pitchFamily="18" charset="0"/>
+                <a:ea typeface="Cambria Math" pitchFamily="18" charset="0"/>
+              </a:rPr>
+              <a:t> </a:t>
+            </a:r>
+            <a:r>
+              <a:rPr lang="it-IT" dirty="0" err="1" smtClean="0">
+                <a:latin typeface="Cambria Math" pitchFamily="18" charset="0"/>
+                <a:ea typeface="Cambria Math" pitchFamily="18" charset="0"/>
+              </a:rPr>
+              <a:t>for</a:t>
+            </a:r>
+            <a:r>
+              <a:rPr lang="it-IT" dirty="0" smtClean="0">
+                <a:latin typeface="Cambria Math" pitchFamily="18" charset="0"/>
+                <a:ea typeface="Cambria Math" pitchFamily="18" charset="0"/>
+              </a:rPr>
+              <a:t> the </a:t>
+            </a:r>
+            <a:r>
+              <a:rPr lang="it-IT" dirty="0" err="1" smtClean="0">
+                <a:latin typeface="Cambria Math" pitchFamily="18" charset="0"/>
+                <a:ea typeface="Cambria Math" pitchFamily="18" charset="0"/>
+              </a:rPr>
+              <a:t>initial</a:t>
+            </a:r>
+            <a:r>
+              <a:rPr lang="it-IT" dirty="0" smtClean="0">
+                <a:latin typeface="Cambria Math" pitchFamily="18" charset="0"/>
+                <a:ea typeface="Cambria Math" pitchFamily="18" charset="0"/>
+              </a:rPr>
+              <a:t> </a:t>
+            </a:r>
+            <a:r>
+              <a:rPr lang="it-IT" dirty="0" err="1" smtClean="0">
+                <a:latin typeface="Cambria Math" pitchFamily="18" charset="0"/>
+                <a:ea typeface="Cambria Math" pitchFamily="18" charset="0"/>
+              </a:rPr>
+              <a:t>construction</a:t>
+            </a:r>
+            <a:endParaRPr lang="it-IT" dirty="0" smtClean="0">
+              <a:latin typeface="Cambria Math" pitchFamily="18" charset="0"/>
+              <a:ea typeface="Cambria Math" pitchFamily="18" charset="0"/>
+            </a:endParaRPr>
           </a:p>
           <a:p>
             <a:pPr>
@@ -7300,19 +8055,37 @@
               </a:lnSpc>
             </a:pPr>
             <a:r>
-              <a:rPr lang="it-IT" smtClean="0">
-                <a:latin typeface="Cambria Math" pitchFamily="18" charset="0"/>
-                <a:ea typeface="Cambria Math" pitchFamily="18" charset="0"/>
-              </a:rPr>
-              <a:t>1</a:t>
-            </a:r>
-            <a:r>
-              <a:rPr lang="it-IT" smtClean="0">
-                <a:latin typeface="Cambria Math" pitchFamily="18" charset="0"/>
-                <a:ea typeface="Cambria Math" pitchFamily="18" charset="0"/>
-              </a:rPr>
-              <a:t> Search strategy</a:t>
-            </a:r>
+              <a:rPr lang="it-IT" dirty="0" smtClean="0">
+                <a:latin typeface="Cambria Math" pitchFamily="18" charset="0"/>
+                <a:ea typeface="Cambria Math" pitchFamily="18" charset="0"/>
+              </a:rPr>
+              <a:t>1 </a:t>
+            </a:r>
+            <a:r>
+              <a:rPr lang="it-IT" dirty="0" err="1" smtClean="0">
+                <a:latin typeface="Cambria Math" pitchFamily="18" charset="0"/>
+                <a:ea typeface="Cambria Math" pitchFamily="18" charset="0"/>
+              </a:rPr>
+              <a:t>Search</a:t>
+            </a:r>
+            <a:r>
+              <a:rPr lang="it-IT" dirty="0" smtClean="0">
+                <a:latin typeface="Cambria Math" pitchFamily="18" charset="0"/>
+                <a:ea typeface="Cambria Math" pitchFamily="18" charset="0"/>
+              </a:rPr>
+              <a:t> </a:t>
+            </a:r>
+            <a:r>
+              <a:rPr lang="it-IT" dirty="0" err="1" smtClean="0">
+                <a:latin typeface="Cambria Math" pitchFamily="18" charset="0"/>
+                <a:ea typeface="Cambria Math" pitchFamily="18" charset="0"/>
+              </a:rPr>
+              <a:t>strategy</a:t>
+            </a:r>
+            <a:endParaRPr lang="it-IT" dirty="0" smtClean="0">
+              <a:latin typeface="Cambria Math" pitchFamily="18" charset="0"/>
+              <a:ea typeface="Cambria Math" pitchFamily="18" charset="0"/>
+            </a:endParaRPr>
           </a:p>
           <a:p>
             <a:pPr>
@@ -7321,24 +8094,187 @@
               </a:lnSpc>
             </a:pPr>
             <a:r>
-              <a:rPr lang="it-IT" smtClean="0">
-                <a:latin typeface="Cambria Math" pitchFamily="18" charset="0"/>
-                <a:ea typeface="Cambria Math" pitchFamily="18" charset="0"/>
-              </a:rPr>
-              <a:t>Iterative Tuning and Error Refinement</a:t>
-            </a:r>
+              <a:rPr lang="it-IT" dirty="0" smtClean="0">
+                <a:latin typeface="Cambria Math" pitchFamily="18" charset="0"/>
+                <a:ea typeface="Cambria Math" pitchFamily="18" charset="0"/>
+              </a:rPr>
+              <a:t>Iterative </a:t>
+            </a:r>
+            <a:r>
+              <a:rPr lang="it-IT" dirty="0" err="1" smtClean="0">
+                <a:latin typeface="Cambria Math" pitchFamily="18" charset="0"/>
+                <a:ea typeface="Cambria Math" pitchFamily="18" charset="0"/>
+              </a:rPr>
+              <a:t>Tuning</a:t>
+            </a:r>
+            <a:r>
+              <a:rPr lang="it-IT" dirty="0" smtClean="0">
+                <a:latin typeface="Cambria Math" pitchFamily="18" charset="0"/>
+                <a:ea typeface="Cambria Math" pitchFamily="18" charset="0"/>
+              </a:rPr>
+              <a:t> and </a:t>
+            </a:r>
+            <a:r>
+              <a:rPr lang="it-IT" dirty="0" err="1" smtClean="0">
+                <a:latin typeface="Cambria Math" pitchFamily="18" charset="0"/>
+                <a:ea typeface="Cambria Math" pitchFamily="18" charset="0"/>
+              </a:rPr>
+              <a:t>Error</a:t>
+            </a:r>
+            <a:r>
+              <a:rPr lang="it-IT" dirty="0" smtClean="0">
+                <a:latin typeface="Cambria Math" pitchFamily="18" charset="0"/>
+                <a:ea typeface="Cambria Math" pitchFamily="18" charset="0"/>
+              </a:rPr>
+              <a:t> </a:t>
+            </a:r>
+            <a:r>
+              <a:rPr lang="it-IT" dirty="0" err="1" smtClean="0">
+                <a:latin typeface="Cambria Math" pitchFamily="18" charset="0"/>
+                <a:ea typeface="Cambria Math" pitchFamily="18" charset="0"/>
+              </a:rPr>
+              <a:t>Refinement</a:t>
+            </a:r>
+            <a:endParaRPr lang="it-IT" dirty="0" smtClean="0">
+              <a:latin typeface="Cambria Math" pitchFamily="18" charset="0"/>
+              <a:ea typeface="Cambria Math" pitchFamily="18" charset="0"/>
+            </a:endParaRPr>
+          </a:p>
+          <a:p>
+            <a:r>
+              <a:rPr lang="it-IT" dirty="0" err="1" smtClean="0">
+                <a:latin typeface="Cambria Math" pitchFamily="18" charset="0"/>
+                <a:ea typeface="Cambria Math" pitchFamily="18" charset="0"/>
+              </a:rPr>
+              <a:t>Testing</a:t>
+            </a:r>
+            <a:r>
+              <a:rPr lang="it-IT" dirty="0" smtClean="0">
+                <a:latin typeface="Cambria Math" pitchFamily="18" charset="0"/>
+                <a:ea typeface="Cambria Math" pitchFamily="18" charset="0"/>
+              </a:rPr>
+              <a:t> </a:t>
+            </a:r>
+            <a:r>
+              <a:rPr lang="it-IT" dirty="0" err="1" smtClean="0">
+                <a:latin typeface="Cambria Math" pitchFamily="18" charset="0"/>
+                <a:ea typeface="Cambria Math" pitchFamily="18" charset="0"/>
+              </a:rPr>
+              <a:t>machine</a:t>
+            </a:r>
+            <a:r>
+              <a:rPr lang="it-IT" dirty="0" smtClean="0">
+                <a:latin typeface="Cambria Math" pitchFamily="18" charset="0"/>
+                <a:ea typeface="Cambria Math" pitchFamily="18" charset="0"/>
+              </a:rPr>
+              <a:t> </a:t>
+            </a:r>
+            <a:r>
+              <a:rPr lang="it-IT" dirty="0" err="1" smtClean="0">
+                <a:latin typeface="Cambria Math" pitchFamily="18" charset="0"/>
+                <a:ea typeface="Cambria Math" pitchFamily="18" charset="0"/>
+              </a:rPr>
+              <a:t>specifics</a:t>
+            </a:r>
+            <a:r>
+              <a:rPr lang="it-IT" dirty="0" smtClean="0">
+                <a:latin typeface="Cambria Math" pitchFamily="18" charset="0"/>
+                <a:ea typeface="Cambria Math" pitchFamily="18" charset="0"/>
+              </a:rPr>
+              <a:t>:</a:t>
+            </a:r>
+          </a:p>
+          <a:p>
+            <a:pPr lvl="1"/>
+            <a:r>
+              <a:rPr lang="it-IT" dirty="0" smtClean="0">
+                <a:latin typeface="Cambria Math" pitchFamily="18" charset="0"/>
+                <a:ea typeface="Cambria Math" pitchFamily="18" charset="0"/>
+              </a:rPr>
+              <a:t>CPU: Intel </a:t>
+            </a:r>
+            <a:r>
+              <a:rPr lang="it-IT" dirty="0" err="1" smtClean="0">
+                <a:latin typeface="Cambria Math" pitchFamily="18" charset="0"/>
+                <a:ea typeface="Cambria Math" pitchFamily="18" charset="0"/>
+              </a:rPr>
+              <a:t>Core</a:t>
+            </a:r>
+            <a:r>
+              <a:rPr lang="it-IT" dirty="0" smtClean="0">
+                <a:latin typeface="Cambria Math" pitchFamily="18" charset="0"/>
+                <a:ea typeface="Cambria Math" pitchFamily="18" charset="0"/>
+              </a:rPr>
+              <a:t> i7-4500U (1,8 </a:t>
+            </a:r>
+            <a:r>
+              <a:rPr lang="it-IT" dirty="0" err="1" smtClean="0">
+                <a:latin typeface="Cambria Math" pitchFamily="18" charset="0"/>
+                <a:ea typeface="Cambria Math" pitchFamily="18" charset="0"/>
+              </a:rPr>
+              <a:t>GHz</a:t>
+            </a:r>
+            <a:r>
+              <a:rPr lang="it-IT" dirty="0" smtClean="0">
+                <a:latin typeface="Cambria Math" pitchFamily="18" charset="0"/>
+                <a:ea typeface="Cambria Math" pitchFamily="18" charset="0"/>
+              </a:rPr>
+              <a:t>)</a:t>
+            </a:r>
+          </a:p>
+          <a:p>
+            <a:pPr lvl="1"/>
+            <a:r>
+              <a:rPr lang="it-IT" dirty="0" smtClean="0">
+                <a:latin typeface="Cambria Math" pitchFamily="18" charset="0"/>
+                <a:ea typeface="Cambria Math" pitchFamily="18" charset="0"/>
+              </a:rPr>
+              <a:t>2 </a:t>
+            </a:r>
+            <a:r>
+              <a:rPr lang="it-IT" dirty="0" err="1" smtClean="0">
+                <a:latin typeface="Cambria Math" pitchFamily="18" charset="0"/>
+                <a:ea typeface="Cambria Math" pitchFamily="18" charset="0"/>
+              </a:rPr>
+              <a:t>Cores</a:t>
+            </a:r>
+            <a:endParaRPr lang="it-IT" dirty="0" smtClean="0">
+              <a:latin typeface="Cambria Math" pitchFamily="18" charset="0"/>
+              <a:ea typeface="Cambria Math" pitchFamily="18" charset="0"/>
+            </a:endParaRPr>
+          </a:p>
+          <a:p>
+            <a:pPr lvl="1"/>
+            <a:r>
+              <a:rPr lang="it-IT" dirty="0" smtClean="0">
+                <a:latin typeface="Cambria Math" pitchFamily="18" charset="0"/>
+                <a:ea typeface="Cambria Math" pitchFamily="18" charset="0"/>
+              </a:rPr>
+              <a:t>RAM: 12 GB </a:t>
+            </a:r>
+          </a:p>
+          <a:p>
+            <a:pPr>
+              <a:lnSpc>
+                <a:spcPct val="150000"/>
+              </a:lnSpc>
+            </a:pPr>
+            <a:endParaRPr lang="it-IT" dirty="0" smtClean="0">
+              <a:latin typeface="Cambria Math" pitchFamily="18" charset="0"/>
+              <a:ea typeface="Cambria Math" pitchFamily="18" charset="0"/>
+            </a:endParaRPr>
           </a:p>
           <a:p>
             <a:pPr>
               <a:buNone/>
             </a:pPr>
-            <a:endParaRPr lang="it-IT" smtClean="0"/>
+            <a:endParaRPr lang="it-IT" dirty="0" smtClean="0"/>
           </a:p>
           <a:p>
             <a:pPr>
               <a:buNone/>
             </a:pPr>
-            <a:endParaRPr lang="it-IT" smtClean="0"/>
+            <a:endParaRPr lang="it-IT" dirty="0" smtClean="0"/>
           </a:p>
           <a:p>
             <a:pPr marL="457200" indent="-457200">
@@ -7426,13 +8362,6 @@
               </a:rPr>
               <a:t>VRPTW with FIXED FLEET SOLVER </a:t>
             </a:r>
-            <a:r>
-              <a:rPr lang="it-IT" smtClean="0">
-                <a:latin typeface="Cambria Math" pitchFamily="18" charset="0"/>
-                <a:ea typeface="Cambria Math" pitchFamily="18" charset="0"/>
-              </a:rPr>
-              <a:t/>
-            </a:r>
             <a:br>
               <a:rPr lang="it-IT" smtClean="0">
                 <a:latin typeface="Cambria Math" pitchFamily="18" charset="0"/>
@@ -7523,10 +8452,6 @@
               </a:rPr>
               <a:t>Faster than regret</a:t>
             </a:r>
-            <a:endParaRPr lang="en-US" smtClean="0">
-              <a:latin typeface="Cambria Math" pitchFamily="18" charset="0"/>
-              <a:ea typeface="Cambria Math" pitchFamily="18" charset="0"/>
-            </a:endParaRPr>
           </a:p>
           <a:p>
             <a:pPr marL="457200" indent="-457200"/>

</xml_diff>